<commit_message>
Evaluation based on 50 questions
</commit_message>
<xml_diff>
--- a/doc/Presentation.pptx
+++ b/doc/Presentation.pptx
@@ -5,7 +5,7 @@
     <p:sldMasterId id="2147483648" r:id="rId1"/>
   </p:sldMasterIdLst>
   <p:notesMasterIdLst>
-    <p:notesMasterId r:id="rId11"/>
+    <p:notesMasterId r:id="rId14"/>
   </p:notesMasterIdLst>
   <p:sldIdLst>
     <p:sldId id="387" r:id="rId2"/>
@@ -16,7 +16,10 @@
     <p:sldId id="406" r:id="rId7"/>
     <p:sldId id="404" r:id="rId8"/>
     <p:sldId id="405" r:id="rId9"/>
-    <p:sldId id="401" r:id="rId10"/>
+    <p:sldId id="407" r:id="rId10"/>
+    <p:sldId id="408" r:id="rId11"/>
+    <p:sldId id="409" r:id="rId12"/>
+    <p:sldId id="401" r:id="rId13"/>
   </p:sldIdLst>
   <p:sldSz cx="12192000" cy="6858000"/>
   <p:notesSz cx="6858000" cy="9144000"/>
@@ -117,7 +120,7 @@
   </p:defaultTextStyle>
   <p:extLst>
     <p:ext uri="{EFAFB233-063F-42B5-8137-9DF3F51BA10A}">
-      <p15:sldGuideLst xmlns:p15="http://schemas.microsoft.com/office/powerpoint/2012/main" xmlns="">
+      <p15:sldGuideLst xmlns="" xmlns:p15="http://schemas.microsoft.com/office/powerpoint/2012/main">
         <p15:guide id="1" orient="horz" pos="2160" userDrawn="1">
           <p15:clr>
             <a:srgbClr val="A4A3A4"/>
@@ -216,7 +219,7 @@
           <a:p>
             <a:fld id="{9287D9B5-79DC-4D13-AD9B-603A64EA5011}" type="datetimeFigureOut">
               <a:rPr lang="en-US" smtClean="0"/>
-              <a:t>3/1/2016</a:t>
+              <a:t>3/16/2016</a:t>
             </a:fld>
             <a:endParaRPr lang="en-US"/>
           </a:p>
@@ -568,6 +571,98 @@
 </p:notes>
 </file>
 
+<file path=ppt/notesSlides/notesSlide2.xml><?xml version="1.0" encoding="utf-8"?>
+<p:notes xmlns:a="http://schemas.openxmlformats.org/drawingml/2006/main" xmlns:r="http://schemas.openxmlformats.org/officeDocument/2006/relationships" xmlns:p="http://schemas.openxmlformats.org/presentationml/2006/main">
+  <p:cSld>
+    <p:spTree>
+      <p:nvGrpSpPr>
+        <p:cNvPr id="1" name=""/>
+        <p:cNvGrpSpPr/>
+        <p:nvPr/>
+      </p:nvGrpSpPr>
+      <p:grpSpPr>
+        <a:xfrm>
+          <a:off x="0" y="0"/>
+          <a:ext cx="0" cy="0"/>
+          <a:chOff x="0" y="0"/>
+          <a:chExt cx="0" cy="0"/>
+        </a:xfrm>
+      </p:grpSpPr>
+      <p:sp>
+        <p:nvSpPr>
+          <p:cNvPr id="2" name="Slide Image Placeholder 1"/>
+          <p:cNvSpPr>
+            <a:spLocks noGrp="1" noRot="1" noChangeAspect="1"/>
+          </p:cNvSpPr>
+          <p:nvPr>
+            <p:ph type="sldImg"/>
+          </p:nvPr>
+        </p:nvSpPr>
+        <p:spPr/>
+      </p:sp>
+      <p:sp>
+        <p:nvSpPr>
+          <p:cNvPr id="3" name="Notes Placeholder 2"/>
+          <p:cNvSpPr>
+            <a:spLocks noGrp="1"/>
+          </p:cNvSpPr>
+          <p:nvPr>
+            <p:ph type="body" idx="1"/>
+          </p:nvPr>
+        </p:nvSpPr>
+        <p:spPr/>
+        <p:txBody>
+          <a:bodyPr/>
+          <a:lstStyle/>
+          <a:p>
+            <a:r>
+              <a:rPr lang="en-US" dirty="0" smtClean="0"/>
+              <a:t>CA</a:t>
+            </a:r>
+            <a:r>
+              <a:rPr lang="en-US" baseline="0" dirty="0" smtClean="0"/>
+              <a:t>S – Common Analysis System</a:t>
+            </a:r>
+            <a:endParaRPr lang="ru-RU" dirty="0"/>
+          </a:p>
+        </p:txBody>
+      </p:sp>
+      <p:sp>
+        <p:nvSpPr>
+          <p:cNvPr id="4" name="Slide Number Placeholder 3"/>
+          <p:cNvSpPr>
+            <a:spLocks noGrp="1"/>
+          </p:cNvSpPr>
+          <p:nvPr>
+            <p:ph type="sldNum" sz="quarter" idx="10"/>
+          </p:nvPr>
+        </p:nvSpPr>
+        <p:spPr/>
+        <p:txBody>
+          <a:bodyPr/>
+          <a:lstStyle/>
+          <a:p>
+            <a:fld id="{43703477-049C-4F9F-8D39-E3817819A441}" type="slidenum">
+              <a:rPr lang="en-US" smtClean="0"/>
+              <a:t>4</a:t>
+            </a:fld>
+            <a:endParaRPr lang="en-US"/>
+          </a:p>
+        </p:txBody>
+      </p:sp>
+    </p:spTree>
+    <p:extLst>
+      <p:ext uri="{BB962C8B-B14F-4D97-AF65-F5344CB8AC3E}">
+        <p14:creationId xmlns:p14="http://schemas.microsoft.com/office/powerpoint/2010/main" val="1815179138"/>
+      </p:ext>
+    </p:extLst>
+  </p:cSld>
+  <p:clrMapOvr>
+    <a:masterClrMapping/>
+  </p:clrMapOvr>
+</p:notes>
+</file>
+
 <file path=ppt/slideLayouts/slideLayout1.xml><?xml version="1.0" encoding="utf-8"?>
 <p:sldLayout xmlns:a="http://schemas.openxmlformats.org/drawingml/2006/main" xmlns:r="http://schemas.openxmlformats.org/officeDocument/2006/relationships" xmlns:p="http://schemas.openxmlformats.org/presentationml/2006/main" type="title" preserve="1">
   <p:cSld name="Титульный слайд">
@@ -699,7 +794,7 @@
           <a:p>
             <a:fld id="{560984F1-1C83-4D6F-937B-F4A0931E74AF}" type="datetime1">
               <a:rPr lang="en-US" smtClean="0"/>
-              <a:t>3/1/2016</a:t>
+              <a:t>3/16/2016</a:t>
             </a:fld>
             <a:endParaRPr lang="en-US"/>
           </a:p>
@@ -873,7 +968,7 @@
           <a:p>
             <a:fld id="{40048B7D-3C9C-433B-88BC-15C9F0EC6FB4}" type="datetime1">
               <a:rPr lang="en-US" smtClean="0"/>
-              <a:t>3/1/2016</a:t>
+              <a:t>3/16/2016</a:t>
             </a:fld>
             <a:endParaRPr lang="en-US"/>
           </a:p>
@@ -1057,7 +1152,7 @@
           <a:p>
             <a:fld id="{37E3DEFA-5DDE-45F6-AAF3-660D4BB67DCD}" type="datetime1">
               <a:rPr lang="en-US" smtClean="0"/>
-              <a:t>3/1/2016</a:t>
+              <a:t>3/16/2016</a:t>
             </a:fld>
             <a:endParaRPr lang="en-US"/>
           </a:p>
@@ -1231,7 +1326,7 @@
           <a:p>
             <a:fld id="{9A2B6F06-9412-4087-9519-F250D40FAA9B}" type="datetime1">
               <a:rPr lang="en-US" smtClean="0"/>
-              <a:t>3/1/2016</a:t>
+              <a:t>3/16/2016</a:t>
             </a:fld>
             <a:endParaRPr lang="en-US"/>
           </a:p>
@@ -1481,7 +1576,7 @@
           <a:p>
             <a:fld id="{77923D88-3BBE-4BF8-B99C-69153F1B6B00}" type="datetime1">
               <a:rPr lang="en-US" smtClean="0"/>
-              <a:t>3/1/2016</a:t>
+              <a:t>3/16/2016</a:t>
             </a:fld>
             <a:endParaRPr lang="en-US"/>
           </a:p>
@@ -1717,7 +1812,7 @@
           <a:p>
             <a:fld id="{FF3431C4-5731-4FE5-8E75-E8C8DA1DE6BC}" type="datetime1">
               <a:rPr lang="en-US" smtClean="0"/>
-              <a:t>3/1/2016</a:t>
+              <a:t>3/16/2016</a:t>
             </a:fld>
             <a:endParaRPr lang="en-US"/>
           </a:p>
@@ -2088,7 +2183,7 @@
           <a:p>
             <a:fld id="{AB26A0F6-EC27-4718-8268-067DCF0570D4}" type="datetime1">
               <a:rPr lang="en-US" smtClean="0"/>
-              <a:t>3/1/2016</a:t>
+              <a:t>3/16/2016</a:t>
             </a:fld>
             <a:endParaRPr lang="en-US"/>
           </a:p>
@@ -2210,7 +2305,7 @@
           <a:p>
             <a:fld id="{FDEFBC4E-F023-4D8A-B06B-ACD25120275F}" type="datetime1">
               <a:rPr lang="en-US" smtClean="0"/>
-              <a:t>3/1/2016</a:t>
+              <a:t>3/16/2016</a:t>
             </a:fld>
             <a:endParaRPr lang="en-US"/>
           </a:p>
@@ -2309,7 +2404,7 @@
           <a:p>
             <a:fld id="{508EC1F3-E5AB-4887-81B1-3ED695DD901B}" type="datetime1">
               <a:rPr lang="en-US" smtClean="0"/>
-              <a:t>3/1/2016</a:t>
+              <a:t>3/16/2016</a:t>
             </a:fld>
             <a:endParaRPr lang="en-US"/>
           </a:p>
@@ -2590,7 +2685,7 @@
           <a:p>
             <a:fld id="{6FCCBD79-94CD-4C46-A343-83CB75AFD5BD}" type="datetime1">
               <a:rPr lang="en-US" smtClean="0"/>
-              <a:t>3/1/2016</a:t>
+              <a:t>3/16/2016</a:t>
             </a:fld>
             <a:endParaRPr lang="en-US"/>
           </a:p>
@@ -2847,7 +2942,7 @@
           <a:p>
             <a:fld id="{CA47C8E6-E082-4645-831D-F582550B1470}" type="datetime1">
               <a:rPr lang="en-US" smtClean="0"/>
-              <a:t>3/1/2016</a:t>
+              <a:t>3/16/2016</a:t>
             </a:fld>
             <a:endParaRPr lang="en-US"/>
           </a:p>
@@ -3064,7 +3159,7 @@
           <a:p>
             <a:fld id="{9A2DE9A4-4438-40EF-8DD7-AE6A8DDFEF8F}" type="datetime1">
               <a:rPr lang="en-US" smtClean="0"/>
-              <a:t>3/1/2016</a:t>
+              <a:t>3/16/2016</a:t>
             </a:fld>
             <a:endParaRPr lang="en-US"/>
           </a:p>
@@ -3523,16 +3618,11 @@
               <a:rPr lang="ru-RU" dirty="0" smtClean="0"/>
               <a:t>«Правила этикета»</a:t>
             </a:r>
-            <a:endParaRPr lang="ru-RU" dirty="0" smtClean="0"/>
           </a:p>
           <a:p>
             <a:r>
               <a:rPr lang="ru-RU" dirty="0" smtClean="0"/>
-              <a:t>2016 </a:t>
-            </a:r>
-            <a:r>
-              <a:rPr lang="ru-RU" dirty="0" smtClean="0"/>
-              <a:t>г.</a:t>
+              <a:t>2016 г.</a:t>
             </a:r>
             <a:endParaRPr lang="ru-RU" dirty="0"/>
           </a:p>
@@ -3592,6 +3682,502 @@
     <p:extLst>
       <p:ext uri="{BB962C8B-B14F-4D97-AF65-F5344CB8AC3E}">
         <p14:creationId xmlns:p14="http://schemas.microsoft.com/office/powerpoint/2010/main" val="1079883610"/>
+      </p:ext>
+    </p:extLst>
+  </p:cSld>
+  <p:clrMapOvr>
+    <a:masterClrMapping/>
+  </p:clrMapOvr>
+</p:sld>
+</file>
+
+<file path=ppt/slides/slide10.xml><?xml version="1.0" encoding="utf-8"?>
+<p:sld xmlns:a="http://schemas.openxmlformats.org/drawingml/2006/main" xmlns:r="http://schemas.openxmlformats.org/officeDocument/2006/relationships" xmlns:p="http://schemas.openxmlformats.org/presentationml/2006/main">
+  <p:cSld>
+    <p:spTree>
+      <p:nvGrpSpPr>
+        <p:cNvPr id="1" name=""/>
+        <p:cNvGrpSpPr/>
+        <p:nvPr/>
+      </p:nvGrpSpPr>
+      <p:grpSpPr>
+        <a:xfrm>
+          <a:off x="0" y="0"/>
+          <a:ext cx="0" cy="0"/>
+          <a:chOff x="0" y="0"/>
+          <a:chExt cx="0" cy="0"/>
+        </a:xfrm>
+      </p:grpSpPr>
+      <p:sp>
+        <p:nvSpPr>
+          <p:cNvPr id="2" name="Заголовок 1"/>
+          <p:cNvSpPr>
+            <a:spLocks noGrp="1"/>
+          </p:cNvSpPr>
+          <p:nvPr>
+            <p:ph type="title"/>
+          </p:nvPr>
+        </p:nvSpPr>
+        <p:spPr/>
+        <p:txBody>
+          <a:bodyPr/>
+          <a:lstStyle/>
+          <a:p>
+            <a:r>
+              <a:rPr lang="ru-RU" dirty="0" smtClean="0"/>
+              <a:t>Полученный опыт</a:t>
+            </a:r>
+            <a:endParaRPr lang="ru-RU" dirty="0"/>
+          </a:p>
+        </p:txBody>
+      </p:sp>
+      <p:sp>
+        <p:nvSpPr>
+          <p:cNvPr id="3" name="Объект 2"/>
+          <p:cNvSpPr>
+            <a:spLocks noGrp="1"/>
+          </p:cNvSpPr>
+          <p:nvPr>
+            <p:ph idx="1"/>
+          </p:nvPr>
+        </p:nvSpPr>
+        <p:spPr/>
+        <p:txBody>
+          <a:bodyPr/>
+          <a:lstStyle/>
+          <a:p>
+            <a:r>
+              <a:rPr lang="ru-RU" dirty="0" smtClean="0"/>
+              <a:t>Инструменты </a:t>
+            </a:r>
+            <a:r>
+              <a:rPr lang="en-US" dirty="0" smtClean="0"/>
+              <a:t>NLP </a:t>
+            </a:r>
+            <a:r>
+              <a:rPr lang="ru-RU" dirty="0" smtClean="0"/>
+              <a:t>для русского языка</a:t>
+            </a:r>
+            <a:r>
+              <a:rPr lang="en-US" dirty="0" smtClean="0"/>
+              <a:t> </a:t>
+            </a:r>
+            <a:r>
+              <a:rPr lang="ru-RU" dirty="0" smtClean="0"/>
+              <a:t>очень «сырые»</a:t>
+            </a:r>
+            <a:endParaRPr lang="en-US" dirty="0" smtClean="0"/>
+          </a:p>
+          <a:p>
+            <a:r>
+              <a:rPr lang="ru-RU" dirty="0" smtClean="0"/>
+              <a:t>Материалы и модели имеют сомнительные лицензии</a:t>
+            </a:r>
+          </a:p>
+          <a:p>
+            <a:r>
+              <a:rPr lang="ru-RU" dirty="0"/>
+              <a:t>Инструменты </a:t>
+            </a:r>
+            <a:r>
+              <a:rPr lang="en-US" dirty="0"/>
+              <a:t>NLP </a:t>
+            </a:r>
+            <a:r>
+              <a:rPr lang="ru-RU" dirty="0"/>
+              <a:t>крайне ресурсоемки (</a:t>
+            </a:r>
+            <a:r>
+              <a:rPr lang="en-US" dirty="0"/>
+              <a:t>32-256 Gb RAM</a:t>
+            </a:r>
+            <a:r>
+              <a:rPr lang="en-US" dirty="0" smtClean="0"/>
+              <a:t>)</a:t>
+            </a:r>
+            <a:endParaRPr lang="ru-RU" dirty="0" smtClean="0"/>
+          </a:p>
+          <a:p>
+            <a:r>
+              <a:rPr lang="en-US" dirty="0" smtClean="0"/>
+              <a:t>Apache UIMA</a:t>
+            </a:r>
+            <a:r>
+              <a:rPr lang="ru-RU" dirty="0" smtClean="0"/>
+              <a:t> не совместима с версией </a:t>
+            </a:r>
+            <a:r>
+              <a:rPr lang="en-US" dirty="0" smtClean="0"/>
+              <a:t>Apache Spark</a:t>
+            </a:r>
+            <a:r>
+              <a:rPr lang="ru-RU" dirty="0" smtClean="0"/>
+              <a:t> на кластере</a:t>
+            </a:r>
+          </a:p>
+          <a:p>
+            <a:endParaRPr lang="ru-RU" dirty="0" smtClean="0"/>
+          </a:p>
+          <a:p>
+            <a:endParaRPr lang="ru-RU" dirty="0" smtClean="0"/>
+          </a:p>
+          <a:p>
+            <a:endParaRPr lang="ru-RU" dirty="0" smtClean="0"/>
+          </a:p>
+          <a:p>
+            <a:pPr lvl="1"/>
+            <a:endParaRPr lang="ru-RU" dirty="0"/>
+          </a:p>
+        </p:txBody>
+      </p:sp>
+      <p:sp>
+        <p:nvSpPr>
+          <p:cNvPr id="4" name="Нижний колонтитул 3"/>
+          <p:cNvSpPr>
+            <a:spLocks noGrp="1"/>
+          </p:cNvSpPr>
+          <p:nvPr>
+            <p:ph type="ftr" sz="quarter" idx="11"/>
+          </p:nvPr>
+        </p:nvSpPr>
+        <p:spPr/>
+        <p:txBody>
+          <a:bodyPr/>
+          <a:lstStyle/>
+          <a:p>
+            <a:r>
+              <a:rPr lang="en-US" dirty="0" err="1"/>
+              <a:t>Artezio</a:t>
+            </a:r>
+            <a:r>
+              <a:rPr lang="en-US" dirty="0"/>
+              <a:t> 2016</a:t>
+            </a:r>
+          </a:p>
+        </p:txBody>
+      </p:sp>
+      <p:sp>
+        <p:nvSpPr>
+          <p:cNvPr id="5" name="Номер слайда 4"/>
+          <p:cNvSpPr>
+            <a:spLocks noGrp="1"/>
+          </p:cNvSpPr>
+          <p:nvPr>
+            <p:ph type="sldNum" sz="quarter" idx="12"/>
+          </p:nvPr>
+        </p:nvSpPr>
+        <p:spPr/>
+        <p:txBody>
+          <a:bodyPr/>
+          <a:lstStyle/>
+          <a:p>
+            <a:fld id="{53FE853A-3A55-4CD3-B026-601242F08E1E}" type="slidenum">
+              <a:rPr lang="en-US" smtClean="0"/>
+              <a:t>10</a:t>
+            </a:fld>
+            <a:endParaRPr lang="en-US"/>
+          </a:p>
+        </p:txBody>
+      </p:sp>
+    </p:spTree>
+    <p:extLst>
+      <p:ext uri="{BB962C8B-B14F-4D97-AF65-F5344CB8AC3E}">
+        <p14:creationId xmlns:p14="http://schemas.microsoft.com/office/powerpoint/2010/main" val="2252048810"/>
+      </p:ext>
+    </p:extLst>
+  </p:cSld>
+  <p:clrMapOvr>
+    <a:masterClrMapping/>
+  </p:clrMapOvr>
+</p:sld>
+</file>
+
+<file path=ppt/slides/slide11.xml><?xml version="1.0" encoding="utf-8"?>
+<p:sld xmlns:a="http://schemas.openxmlformats.org/drawingml/2006/main" xmlns:r="http://schemas.openxmlformats.org/officeDocument/2006/relationships" xmlns:p="http://schemas.openxmlformats.org/presentationml/2006/main">
+  <p:cSld>
+    <p:spTree>
+      <p:nvGrpSpPr>
+        <p:cNvPr id="1" name=""/>
+        <p:cNvGrpSpPr/>
+        <p:nvPr/>
+      </p:nvGrpSpPr>
+      <p:grpSpPr>
+        <a:xfrm>
+          <a:off x="0" y="0"/>
+          <a:ext cx="0" cy="0"/>
+          <a:chOff x="0" y="0"/>
+          <a:chExt cx="0" cy="0"/>
+        </a:xfrm>
+      </p:grpSpPr>
+      <p:sp>
+        <p:nvSpPr>
+          <p:cNvPr id="2" name="Заголовок 1"/>
+          <p:cNvSpPr>
+            <a:spLocks noGrp="1"/>
+          </p:cNvSpPr>
+          <p:nvPr>
+            <p:ph type="title"/>
+          </p:nvPr>
+        </p:nvSpPr>
+        <p:spPr/>
+        <p:txBody>
+          <a:bodyPr/>
+          <a:lstStyle/>
+          <a:p>
+            <a:r>
+              <a:rPr lang="ru-RU" dirty="0" smtClean="0"/>
+              <a:t>Используемые ресурсы</a:t>
+            </a:r>
+            <a:endParaRPr lang="ru-RU" dirty="0"/>
+          </a:p>
+        </p:txBody>
+      </p:sp>
+      <p:sp>
+        <p:nvSpPr>
+          <p:cNvPr id="3" name="Объект 2"/>
+          <p:cNvSpPr>
+            <a:spLocks noGrp="1"/>
+          </p:cNvSpPr>
+          <p:nvPr>
+            <p:ph idx="1"/>
+          </p:nvPr>
+        </p:nvSpPr>
+        <p:spPr/>
+        <p:txBody>
+          <a:bodyPr/>
+          <a:lstStyle/>
+          <a:p>
+            <a:r>
+              <a:rPr lang="en-US" dirty="0" err="1" smtClean="0"/>
+              <a:t>DbPedia</a:t>
+            </a:r>
+            <a:r>
+              <a:rPr lang="ru-RU" dirty="0" smtClean="0"/>
+              <a:t> (</a:t>
+            </a:r>
+            <a:r>
+              <a:rPr lang="en-US" dirty="0" smtClean="0"/>
+              <a:t>several datasets)</a:t>
+            </a:r>
+          </a:p>
+          <a:p>
+            <a:r>
+              <a:rPr lang="en-US" dirty="0" err="1" smtClean="0"/>
+              <a:t>Wordnet</a:t>
+            </a:r>
+            <a:endParaRPr lang="en-US" dirty="0" smtClean="0"/>
+          </a:p>
+          <a:p>
+            <a:r>
+              <a:rPr lang="en-US" dirty="0" smtClean="0"/>
+              <a:t>Freebase</a:t>
+            </a:r>
+          </a:p>
+          <a:p>
+            <a:r>
+              <a:rPr lang="en-US" dirty="0" err="1" smtClean="0"/>
+              <a:t>Yandex</a:t>
+            </a:r>
+            <a:r>
+              <a:rPr lang="en-US" dirty="0" smtClean="0"/>
+              <a:t> </a:t>
+            </a:r>
+            <a:r>
+              <a:rPr lang="en-US" dirty="0" err="1" smtClean="0"/>
+              <a:t>SpeechKit</a:t>
+            </a:r>
+            <a:endParaRPr lang="en-US" dirty="0" smtClean="0"/>
+          </a:p>
+          <a:p>
+            <a:r>
+              <a:rPr lang="en-US" dirty="0" err="1" smtClean="0"/>
+              <a:t>OpenCorpora</a:t>
+            </a:r>
+            <a:endParaRPr lang="en-US" dirty="0" smtClean="0"/>
+          </a:p>
+          <a:p>
+            <a:r>
+              <a:rPr lang="ru-RU" dirty="0" err="1" smtClean="0"/>
+              <a:t>СинТагРус</a:t>
+            </a:r>
+            <a:endParaRPr lang="en-US" dirty="0" smtClean="0"/>
+          </a:p>
+        </p:txBody>
+      </p:sp>
+      <p:sp>
+        <p:nvSpPr>
+          <p:cNvPr id="4" name="Нижний колонтитул 3"/>
+          <p:cNvSpPr>
+            <a:spLocks noGrp="1"/>
+          </p:cNvSpPr>
+          <p:nvPr>
+            <p:ph type="ftr" sz="quarter" idx="11"/>
+          </p:nvPr>
+        </p:nvSpPr>
+        <p:spPr/>
+        <p:txBody>
+          <a:bodyPr/>
+          <a:lstStyle/>
+          <a:p>
+            <a:r>
+              <a:rPr lang="en-US" dirty="0" err="1"/>
+              <a:t>Artezio</a:t>
+            </a:r>
+            <a:r>
+              <a:rPr lang="en-US" dirty="0"/>
+              <a:t> 2016</a:t>
+            </a:r>
+          </a:p>
+        </p:txBody>
+      </p:sp>
+      <p:sp>
+        <p:nvSpPr>
+          <p:cNvPr id="5" name="Номер слайда 4"/>
+          <p:cNvSpPr>
+            <a:spLocks noGrp="1"/>
+          </p:cNvSpPr>
+          <p:nvPr>
+            <p:ph type="sldNum" sz="quarter" idx="12"/>
+          </p:nvPr>
+        </p:nvSpPr>
+        <p:spPr/>
+        <p:txBody>
+          <a:bodyPr/>
+          <a:lstStyle/>
+          <a:p>
+            <a:fld id="{53FE853A-3A55-4CD3-B026-601242F08E1E}" type="slidenum">
+              <a:rPr lang="en-US" smtClean="0"/>
+              <a:t>11</a:t>
+            </a:fld>
+            <a:endParaRPr lang="en-US"/>
+          </a:p>
+        </p:txBody>
+      </p:sp>
+    </p:spTree>
+    <p:extLst>
+      <p:ext uri="{BB962C8B-B14F-4D97-AF65-F5344CB8AC3E}">
+        <p14:creationId xmlns:p14="http://schemas.microsoft.com/office/powerpoint/2010/main" val="2143035052"/>
+      </p:ext>
+    </p:extLst>
+  </p:cSld>
+  <p:clrMapOvr>
+    <a:masterClrMapping/>
+  </p:clrMapOvr>
+</p:sld>
+</file>
+
+<file path=ppt/slides/slide12.xml><?xml version="1.0" encoding="utf-8"?>
+<p:sld xmlns:a="http://schemas.openxmlformats.org/drawingml/2006/main" xmlns:r="http://schemas.openxmlformats.org/officeDocument/2006/relationships" xmlns:p="http://schemas.openxmlformats.org/presentationml/2006/main">
+  <p:cSld>
+    <p:spTree>
+      <p:nvGrpSpPr>
+        <p:cNvPr id="1" name=""/>
+        <p:cNvGrpSpPr/>
+        <p:nvPr/>
+      </p:nvGrpSpPr>
+      <p:grpSpPr>
+        <a:xfrm>
+          <a:off x="0" y="0"/>
+          <a:ext cx="0" cy="0"/>
+          <a:chOff x="0" y="0"/>
+          <a:chExt cx="0" cy="0"/>
+        </a:xfrm>
+      </p:grpSpPr>
+      <p:sp>
+        <p:nvSpPr>
+          <p:cNvPr id="4" name="Заголовок 3"/>
+          <p:cNvSpPr>
+            <a:spLocks noGrp="1"/>
+          </p:cNvSpPr>
+          <p:nvPr>
+            <p:ph type="title"/>
+          </p:nvPr>
+        </p:nvSpPr>
+        <p:spPr/>
+        <p:txBody>
+          <a:bodyPr/>
+          <a:lstStyle/>
+          <a:p>
+            <a:r>
+              <a:rPr lang="en-US" dirty="0" smtClean="0"/>
+              <a:t>Q&amp;A</a:t>
+            </a:r>
+            <a:endParaRPr lang="ru-RU" dirty="0"/>
+          </a:p>
+        </p:txBody>
+      </p:sp>
+      <p:sp>
+        <p:nvSpPr>
+          <p:cNvPr id="5" name="Текст 4"/>
+          <p:cNvSpPr>
+            <a:spLocks noGrp="1"/>
+          </p:cNvSpPr>
+          <p:nvPr>
+            <p:ph type="body" idx="1"/>
+          </p:nvPr>
+        </p:nvSpPr>
+        <p:spPr/>
+        <p:txBody>
+          <a:bodyPr/>
+          <a:lstStyle/>
+          <a:p>
+            <a:endParaRPr lang="ru-RU" dirty="0"/>
+          </a:p>
+        </p:txBody>
+      </p:sp>
+      <p:sp>
+        <p:nvSpPr>
+          <p:cNvPr id="6" name="Нижний колонтитул 5"/>
+          <p:cNvSpPr>
+            <a:spLocks noGrp="1"/>
+          </p:cNvSpPr>
+          <p:nvPr>
+            <p:ph type="ftr" sz="quarter" idx="11"/>
+          </p:nvPr>
+        </p:nvSpPr>
+        <p:spPr/>
+        <p:txBody>
+          <a:bodyPr/>
+          <a:lstStyle/>
+          <a:p>
+            <a:r>
+              <a:rPr lang="en-US" dirty="0" err="1"/>
+              <a:t>Artezio</a:t>
+            </a:r>
+            <a:r>
+              <a:rPr lang="en-US" dirty="0"/>
+              <a:t> 2016</a:t>
+            </a:r>
+          </a:p>
+        </p:txBody>
+      </p:sp>
+      <p:sp>
+        <p:nvSpPr>
+          <p:cNvPr id="7" name="Номер слайда 6"/>
+          <p:cNvSpPr>
+            <a:spLocks noGrp="1"/>
+          </p:cNvSpPr>
+          <p:nvPr>
+            <p:ph type="sldNum" sz="quarter" idx="12"/>
+          </p:nvPr>
+        </p:nvSpPr>
+        <p:spPr/>
+        <p:txBody>
+          <a:bodyPr/>
+          <a:lstStyle/>
+          <a:p>
+            <a:fld id="{53FE853A-3A55-4CD3-B026-601242F08E1E}" type="slidenum">
+              <a:rPr lang="en-US" smtClean="0"/>
+              <a:t>12</a:t>
+            </a:fld>
+            <a:endParaRPr lang="en-US"/>
+          </a:p>
+        </p:txBody>
+      </p:sp>
+    </p:spTree>
+    <p:extLst>
+      <p:ext uri="{BB962C8B-B14F-4D97-AF65-F5344CB8AC3E}">
+        <p14:creationId xmlns:p14="http://schemas.microsoft.com/office/powerpoint/2010/main" val="3750068630"/>
       </p:ext>
     </p:extLst>
   </p:cSld>
@@ -3697,7 +4283,6 @@
               <a:rPr lang="en-US" dirty="0"/>
               <a:t> 2016</a:t>
             </a:r>
-            <a:endParaRPr lang="en-US" dirty="0"/>
           </a:p>
         </p:txBody>
       </p:sp>
@@ -3838,8 +4423,19 @@
           <a:p>
             <a:r>
               <a:rPr lang="ru-RU" dirty="0" smtClean="0"/>
-              <a:t>Система должна предоставить несколько (до 25) ранжированных ответов на выбор</a:t>
-            </a:r>
+              <a:t>Система должна предоставить несколько (до 25) ранжированных ответов на </a:t>
+            </a:r>
+            <a:r>
+              <a:rPr lang="ru-RU" dirty="0" smtClean="0"/>
+              <a:t>выбор</a:t>
+            </a:r>
+          </a:p>
+          <a:p>
+            <a:r>
+              <a:rPr lang="ru-RU" dirty="0" smtClean="0"/>
+              <a:t>Вопросы должны быть в области знаний правил этикета</a:t>
+            </a:r>
+            <a:endParaRPr lang="ru-RU" dirty="0" smtClean="0"/>
           </a:p>
           <a:p>
             <a:endParaRPr lang="ru-RU" dirty="0" smtClean="0"/>
@@ -3873,7 +4469,6 @@
               <a:rPr lang="en-US" dirty="0"/>
               <a:t> 2016</a:t>
             </a:r>
-            <a:endParaRPr lang="en-US" dirty="0"/>
           </a:p>
         </p:txBody>
       </p:sp>
@@ -3976,7 +4571,6 @@
               <a:rPr lang="en-US" dirty="0"/>
               <a:t> 2016</a:t>
             </a:r>
-            <a:endParaRPr lang="en-US" dirty="0"/>
           </a:p>
         </p:txBody>
       </p:sp>
@@ -4026,12 +4620,12 @@
           <a:graphicData uri="http://schemas.openxmlformats.org/presentationml/2006/ole">
             <mc:AlternateContent xmlns:mc="http://schemas.openxmlformats.org/markup-compatibility/2006">
               <mc:Choice xmlns:v="urn:schemas-microsoft-com:vml" Requires="v">
-                <p:oleObj spid="_x0000_s1029" name="Visio" r:id="rId3" imgW="4534992" imgH="1475010" progId="Visio.Drawing.11">
+                <p:oleObj spid="_x0000_s1033" name="Visio" r:id="rId4" imgW="4534992" imgH="1475010" progId="Visio.Drawing.11">
                   <p:embed/>
                 </p:oleObj>
               </mc:Choice>
               <mc:Fallback>
-                <p:oleObj name="Visio" r:id="rId3" imgW="4534992" imgH="1475010" progId="Visio.Drawing.11">
+                <p:oleObj name="Visio" r:id="rId4" imgW="4534992" imgH="1475010" progId="Visio.Drawing.11">
                   <p:embed/>
                   <p:pic>
                     <p:nvPicPr>
@@ -4040,7 +4634,7 @@
                       <p:nvPr/>
                     </p:nvPicPr>
                     <p:blipFill>
-                      <a:blip r:embed="rId4"/>
+                      <a:blip r:embed="rId5"/>
                       <a:stretch>
                         <a:fillRect/>
                       </a:stretch>
@@ -4240,7 +4834,6 @@
               <a:rPr lang="en-US" dirty="0"/>
               <a:t> 2016</a:t>
             </a:r>
-            <a:endParaRPr lang="en-US" dirty="0"/>
           </a:p>
         </p:txBody>
       </p:sp>
@@ -4374,7 +4967,7 @@
           <a:graphicData uri="http://schemas.openxmlformats.org/presentationml/2006/ole">
             <mc:AlternateContent xmlns:mc="http://schemas.openxmlformats.org/markup-compatibility/2006">
               <mc:Choice xmlns:v="urn:schemas-microsoft-com:vml" Requires="v">
-                <p:oleObj spid="_x0000_s2052" name="Visio" r:id="rId3" imgW="4534992" imgH="1475010" progId="Visio.Drawing.11">
+                <p:oleObj spid="_x0000_s2056" name="Visio" r:id="rId3" imgW="4534992" imgH="1475010" progId="Visio.Drawing.11">
                   <p:embed/>
                 </p:oleObj>
               </mc:Choice>
@@ -4485,7 +5078,6 @@
               <a:rPr lang="en-US" dirty="0"/>
               <a:t> 2016</a:t>
             </a:r>
-            <a:endParaRPr lang="en-US" dirty="0"/>
           </a:p>
         </p:txBody>
       </p:sp>
@@ -4585,7 +5177,7 @@
           <a:graphicData uri="http://schemas.openxmlformats.org/presentationml/2006/ole">
             <mc:AlternateContent xmlns:mc="http://schemas.openxmlformats.org/markup-compatibility/2006">
               <mc:Choice xmlns:v="urn:schemas-microsoft-com:vml" Requires="v">
-                <p:oleObj spid="_x0000_s5122" name="Visio" r:id="rId3" imgW="4534992" imgH="1475010" progId="Visio.Drawing.11">
+                <p:oleObj spid="_x0000_s5126" name="Visio" r:id="rId3" imgW="4534992" imgH="1475010" progId="Visio.Drawing.11">
                   <p:embed/>
                 </p:oleObj>
               </mc:Choice>
@@ -4696,7 +5288,6 @@
               <a:rPr lang="en-US" dirty="0"/>
               <a:t> 2016</a:t>
             </a:r>
-            <a:endParaRPr lang="en-US" dirty="0"/>
           </a:p>
         </p:txBody>
       </p:sp>
@@ -4827,7 +5418,7 @@
           <a:graphicData uri="http://schemas.openxmlformats.org/presentationml/2006/ole">
             <mc:AlternateContent xmlns:mc="http://schemas.openxmlformats.org/markup-compatibility/2006">
               <mc:Choice xmlns:v="urn:schemas-microsoft-com:vml" Requires="v">
-                <p:oleObj spid="_x0000_s3075" name="Visio" r:id="rId3" imgW="8440844" imgH="2825010" progId="Visio.Drawing.11">
+                <p:oleObj spid="_x0000_s3079" name="Visio" r:id="rId3" imgW="8440844" imgH="2825010" progId="Visio.Drawing.11">
                   <p:embed/>
                 </p:oleObj>
               </mc:Choice>
@@ -4938,7 +5529,6 @@
               <a:rPr lang="en-US" dirty="0"/>
               <a:t> 2016</a:t>
             </a:r>
-            <a:endParaRPr lang="en-US" dirty="0"/>
           </a:p>
         </p:txBody>
       </p:sp>
@@ -5107,7 +5697,7 @@
           <a:graphicData uri="http://schemas.openxmlformats.org/presentationml/2006/ole">
             <mc:AlternateContent xmlns:mc="http://schemas.openxmlformats.org/markup-compatibility/2006">
               <mc:Choice xmlns:v="urn:schemas-microsoft-com:vml" Requires="v">
-                <p:oleObj spid="_x0000_s4099" name="Visio" r:id="rId3" imgW="6334888" imgH="2555010" progId="Visio.Drawing.11">
+                <p:oleObj spid="_x0000_s4103" name="Visio" r:id="rId3" imgW="6334888" imgH="2555010" progId="Visio.Drawing.11">
                   <p:embed/>
                 </p:oleObj>
               </mc:Choice>
@@ -5174,7 +5764,7 @@
       </p:grpSpPr>
       <p:sp>
         <p:nvSpPr>
-          <p:cNvPr id="4" name="Заголовок 3"/>
+          <p:cNvPr id="2" name="Заголовок 1"/>
           <p:cNvSpPr>
             <a:spLocks noGrp="1"/>
           </p:cNvSpPr>
@@ -5188,8 +5778,8 @@
           <a:lstStyle/>
           <a:p>
             <a:r>
-              <a:rPr lang="en-US" dirty="0" smtClean="0"/>
-              <a:t>Q&amp;A</a:t>
+              <a:rPr lang="ru-RU" dirty="0" smtClean="0"/>
+              <a:t>Полученные результаты</a:t>
             </a:r>
             <a:endParaRPr lang="ru-RU" dirty="0"/>
           </a:p>
@@ -5197,26 +5787,79 @@
       </p:sp>
       <p:sp>
         <p:nvSpPr>
-          <p:cNvPr id="5" name="Текст 4"/>
-          <p:cNvSpPr>
-            <a:spLocks noGrp="1"/>
-          </p:cNvSpPr>
-          <p:nvPr>
-            <p:ph type="body" idx="1"/>
-          </p:nvPr>
-        </p:nvSpPr>
-        <p:spPr/>
-        <p:txBody>
-          <a:bodyPr/>
-          <a:lstStyle/>
-          <a:p>
+          <p:cNvPr id="3" name="Объект 2"/>
+          <p:cNvSpPr>
+            <a:spLocks noGrp="1"/>
+          </p:cNvSpPr>
+          <p:nvPr>
+            <p:ph idx="1"/>
+          </p:nvPr>
+        </p:nvSpPr>
+        <p:spPr/>
+        <p:txBody>
+          <a:bodyPr/>
+          <a:lstStyle/>
+          <a:p>
+            <a:r>
+              <a:rPr lang="ru-RU" dirty="0" smtClean="0"/>
+              <a:t>На выборке в 50 вопросов</a:t>
+            </a:r>
+            <a:endParaRPr lang="ru-RU" dirty="0" smtClean="0"/>
+          </a:p>
+          <a:p>
+            <a:pPr lvl="1"/>
+            <a:r>
+              <a:rPr lang="ru-RU" dirty="0" smtClean="0"/>
+              <a:t>% получения ответа: </a:t>
+            </a:r>
+            <a:r>
+              <a:rPr lang="ru-RU" b="1" dirty="0" smtClean="0"/>
+              <a:t>60%</a:t>
+            </a:r>
+            <a:endParaRPr lang="ru-RU" b="1" dirty="0" smtClean="0"/>
+          </a:p>
+          <a:p>
+            <a:pPr lvl="1"/>
+            <a:r>
+              <a:rPr lang="ru-RU" dirty="0" smtClean="0"/>
+              <a:t>Условная точность ответа: </a:t>
+            </a:r>
+            <a:r>
+              <a:rPr lang="ru-RU" b="1" dirty="0" smtClean="0"/>
+              <a:t>80%</a:t>
+            </a:r>
+            <a:endParaRPr lang="ru-RU" b="1" dirty="0" smtClean="0"/>
+          </a:p>
+          <a:p>
+            <a:r>
+              <a:rPr lang="ru-RU" dirty="0" smtClean="0"/>
+              <a:t>Время </a:t>
+            </a:r>
+            <a:r>
+              <a:rPr lang="ru-RU" dirty="0" smtClean="0"/>
+              <a:t>ответа </a:t>
+            </a:r>
+            <a:r>
+              <a:rPr lang="ru-RU" dirty="0" smtClean="0"/>
+              <a:t>на 1 вопрос 1-3 мин</a:t>
+            </a:r>
+            <a:endParaRPr lang="ru-RU" dirty="0" smtClean="0"/>
+          </a:p>
+          <a:p>
+            <a:endParaRPr lang="ru-RU" dirty="0" smtClean="0"/>
+          </a:p>
+          <a:p>
+            <a:endParaRPr lang="ru-RU" dirty="0" smtClean="0"/>
+          </a:p>
+          <a:p>
+            <a:pPr lvl="1"/>
             <a:endParaRPr lang="ru-RU" dirty="0"/>
           </a:p>
         </p:txBody>
       </p:sp>
       <p:sp>
         <p:nvSpPr>
-          <p:cNvPr id="6" name="Нижний колонтитул 5"/>
+          <p:cNvPr id="4" name="Нижний колонтитул 3"/>
           <p:cNvSpPr>
             <a:spLocks noGrp="1"/>
           </p:cNvSpPr>
@@ -5237,13 +5880,12 @@
               <a:rPr lang="en-US" dirty="0"/>
               <a:t> 2016</a:t>
             </a:r>
-            <a:endParaRPr lang="en-US" dirty="0"/>
-          </a:p>
-        </p:txBody>
-      </p:sp>
-      <p:sp>
-        <p:nvSpPr>
-          <p:cNvPr id="7" name="Номер слайда 6"/>
+          </a:p>
+        </p:txBody>
+      </p:sp>
+      <p:sp>
+        <p:nvSpPr>
+          <p:cNvPr id="5" name="Номер слайда 4"/>
           <p:cNvSpPr>
             <a:spLocks noGrp="1"/>
           </p:cNvSpPr>
@@ -5267,7 +5909,7 @@
     </p:spTree>
     <p:extLst>
       <p:ext uri="{BB962C8B-B14F-4D97-AF65-F5344CB8AC3E}">
-        <p14:creationId xmlns:p14="http://schemas.microsoft.com/office/powerpoint/2010/main" val="3750068630"/>
+        <p14:creationId xmlns:p14="http://schemas.microsoft.com/office/powerpoint/2010/main" val="2907781502"/>
       </p:ext>
     </p:extLst>
   </p:cSld>
@@ -5532,7 +6174,7 @@
   <a:extraClrSchemeLst/>
   <a:extLst>
     <a:ext uri="{05A4C25C-085E-4340-85A3-A5531E510DB2}">
-      <thm15:themeFamily xmlns:thm15="http://schemas.microsoft.com/office/thememl/2012/main" xmlns="" name="Office Theme" id="{62F939B6-93AF-4DB8-9C6B-D6C7DFDC589F}" vid="{4A3C46E8-61CC-4603-A589-7422A47A8E4A}"/>
+      <thm15:themeFamily xmlns="" xmlns:thm15="http://schemas.microsoft.com/office/thememl/2012/main" name="Office Theme" id="{62F939B6-93AF-4DB8-9C6B-D6C7DFDC589F}" vid="{4A3C46E8-61CC-4603-A589-7422A47A8E4A}"/>
     </a:ext>
   </a:extLst>
 </a:theme>
@@ -5793,7 +6435,7 @@
   <a:extraClrSchemeLst/>
   <a:extLst>
     <a:ext uri="{05A4C25C-085E-4340-85A3-A5531E510DB2}">
-      <thm15:themeFamily xmlns:thm15="http://schemas.microsoft.com/office/thememl/2012/main" xmlns="" name="Office Theme" id="{62F939B6-93AF-4DB8-9C6B-D6C7DFDC589F}" vid="{4A3C46E8-61CC-4603-A589-7422A47A8E4A}"/>
+      <thm15:themeFamily xmlns="" xmlns:thm15="http://schemas.microsoft.com/office/thememl/2012/main" name="Office Theme" id="{62F939B6-93AF-4DB8-9C6B-D6C7DFDC589F}" vid="{4A3C46E8-61CC-4603-A589-7422A47A8E4A}"/>
     </a:ext>
   </a:extLst>
 </a:theme>

</xml_diff>